<commit_message>
Have to upload daily
Really sleepy and tired, did a lot of office work today.
</commit_message>
<xml_diff>
--- a/Skunk Head/Skunk Head.pptx
+++ b/Skunk Head/Skunk Head.pptx
@@ -17,6 +17,7 @@
     <p:sldId id="262" r:id="rId11"/>
     <p:sldId id="261" r:id="rId12"/>
     <p:sldId id="259" r:id="rId13"/>
+    <p:sldId id="268" r:id="rId14"/>
   </p:sldIdLst>
   <p:sldSz cx="12801600" cy="9601200" type="A3"/>
   <p:notesSz cx="6858000" cy="9144000"/>
@@ -142,6 +143,11 @@
             <p14:sldId id="259"/>
           </p14:sldIdLst>
         </p14:section>
+        <p14:section name="Work Flow" id="{2B07C8C5-B67F-432D-B8A0-BFA4608E5C70}">
+          <p14:sldIdLst>
+            <p14:sldId id="268"/>
+          </p14:sldIdLst>
+        </p14:section>
       </p14:sectionLst>
     </p:ext>
     <p:ext uri="{EFAFB233-063F-42B5-8137-9DF3F51BA10A}">
@@ -282,7 +288,7 @@
           <a:p>
             <a:fld id="{D0D78C27-3CB4-4925-A443-120407CBE20C}" type="datetimeFigureOut">
               <a:rPr lang="en-US" smtClean="0"/>
-              <a:t>03-Sep-18</a:t>
+              <a:t>04-Sep-18</a:t>
             </a:fld>
             <a:endParaRPr lang="en-US"/>
           </a:p>
@@ -452,7 +458,7 @@
           <a:p>
             <a:fld id="{D0D78C27-3CB4-4925-A443-120407CBE20C}" type="datetimeFigureOut">
               <a:rPr lang="en-US" smtClean="0"/>
-              <a:t>03-Sep-18</a:t>
+              <a:t>04-Sep-18</a:t>
             </a:fld>
             <a:endParaRPr lang="en-US"/>
           </a:p>
@@ -632,7 +638,7 @@
           <a:p>
             <a:fld id="{D0D78C27-3CB4-4925-A443-120407CBE20C}" type="datetimeFigureOut">
               <a:rPr lang="en-US" smtClean="0"/>
-              <a:t>03-Sep-18</a:t>
+              <a:t>04-Sep-18</a:t>
             </a:fld>
             <a:endParaRPr lang="en-US"/>
           </a:p>
@@ -802,7 +808,7 @@
           <a:p>
             <a:fld id="{D0D78C27-3CB4-4925-A443-120407CBE20C}" type="datetimeFigureOut">
               <a:rPr lang="en-US" smtClean="0"/>
-              <a:t>03-Sep-18</a:t>
+              <a:t>04-Sep-18</a:t>
             </a:fld>
             <a:endParaRPr lang="en-US"/>
           </a:p>
@@ -1046,7 +1052,7 @@
           <a:p>
             <a:fld id="{D0D78C27-3CB4-4925-A443-120407CBE20C}" type="datetimeFigureOut">
               <a:rPr lang="en-US" smtClean="0"/>
-              <a:t>03-Sep-18</a:t>
+              <a:t>04-Sep-18</a:t>
             </a:fld>
             <a:endParaRPr lang="en-US"/>
           </a:p>
@@ -1278,7 +1284,7 @@
           <a:p>
             <a:fld id="{D0D78C27-3CB4-4925-A443-120407CBE20C}" type="datetimeFigureOut">
               <a:rPr lang="en-US" smtClean="0"/>
-              <a:t>03-Sep-18</a:t>
+              <a:t>04-Sep-18</a:t>
             </a:fld>
             <a:endParaRPr lang="en-US"/>
           </a:p>
@@ -1645,7 +1651,7 @@
           <a:p>
             <a:fld id="{D0D78C27-3CB4-4925-A443-120407CBE20C}" type="datetimeFigureOut">
               <a:rPr lang="en-US" smtClean="0"/>
-              <a:t>03-Sep-18</a:t>
+              <a:t>04-Sep-18</a:t>
             </a:fld>
             <a:endParaRPr lang="en-US"/>
           </a:p>
@@ -1763,7 +1769,7 @@
           <a:p>
             <a:fld id="{D0D78C27-3CB4-4925-A443-120407CBE20C}" type="datetimeFigureOut">
               <a:rPr lang="en-US" smtClean="0"/>
-              <a:t>03-Sep-18</a:t>
+              <a:t>04-Sep-18</a:t>
             </a:fld>
             <a:endParaRPr lang="en-US"/>
           </a:p>
@@ -1858,7 +1864,7 @@
           <a:p>
             <a:fld id="{D0D78C27-3CB4-4925-A443-120407CBE20C}" type="datetimeFigureOut">
               <a:rPr lang="en-US" smtClean="0"/>
-              <a:t>03-Sep-18</a:t>
+              <a:t>04-Sep-18</a:t>
             </a:fld>
             <a:endParaRPr lang="en-US"/>
           </a:p>
@@ -2135,7 +2141,7 @@
           <a:p>
             <a:fld id="{D0D78C27-3CB4-4925-A443-120407CBE20C}" type="datetimeFigureOut">
               <a:rPr lang="en-US" smtClean="0"/>
-              <a:t>03-Sep-18</a:t>
+              <a:t>04-Sep-18</a:t>
             </a:fld>
             <a:endParaRPr lang="en-US"/>
           </a:p>
@@ -2392,7 +2398,7 @@
           <a:p>
             <a:fld id="{D0D78C27-3CB4-4925-A443-120407CBE20C}" type="datetimeFigureOut">
               <a:rPr lang="en-US" smtClean="0"/>
-              <a:t>03-Sep-18</a:t>
+              <a:t>04-Sep-18</a:t>
             </a:fld>
             <a:endParaRPr lang="en-US"/>
           </a:p>
@@ -2605,7 +2611,7 @@
           <a:p>
             <a:fld id="{D0D78C27-3CB4-4925-A443-120407CBE20C}" type="datetimeFigureOut">
               <a:rPr lang="en-US" smtClean="0"/>
-              <a:t>03-Sep-18</a:t>
+              <a:t>04-Sep-18</a:t>
             </a:fld>
             <a:endParaRPr lang="en-US"/>
           </a:p>
@@ -5021,6 +5027,78 @@
       </p:par>
     </p:tnLst>
   </p:timing>
+</p:sld>
+</file>
+
+<file path=ppt/slides/slide13.xml><?xml version="1.0" encoding="utf-8"?>
+<p:sld xmlns:a="http://schemas.openxmlformats.org/drawingml/2006/main" xmlns:r="http://schemas.openxmlformats.org/officeDocument/2006/relationships" xmlns:p="http://schemas.openxmlformats.org/presentationml/2006/main">
+  <p:cSld>
+    <p:spTree>
+      <p:nvGrpSpPr>
+        <p:cNvPr id="1" name=""/>
+        <p:cNvGrpSpPr/>
+        <p:nvPr/>
+      </p:nvGrpSpPr>
+      <p:grpSpPr>
+        <a:xfrm>
+          <a:off x="0" y="0"/>
+          <a:ext cx="0" cy="0"/>
+          <a:chOff x="0" y="0"/>
+          <a:chExt cx="0" cy="0"/>
+        </a:xfrm>
+      </p:grpSpPr>
+      <p:sp>
+        <p:nvSpPr>
+          <p:cNvPr id="2" name="Title 1"/>
+          <p:cNvSpPr>
+            <a:spLocks noGrp="1"/>
+          </p:cNvSpPr>
+          <p:nvPr>
+            <p:ph type="title"/>
+          </p:nvPr>
+        </p:nvSpPr>
+        <p:spPr/>
+        <p:txBody>
+          <a:bodyPr/>
+          <a:lstStyle/>
+          <a:p>
+            <a:r>
+              <a:rPr lang="en-US" dirty="0" smtClean="0"/>
+              <a:t>Work Outline</a:t>
+            </a:r>
+            <a:endParaRPr lang="en-US" dirty="0"/>
+          </a:p>
+        </p:txBody>
+      </p:sp>
+      <p:sp>
+        <p:nvSpPr>
+          <p:cNvPr id="3" name="Content Placeholder 2"/>
+          <p:cNvSpPr>
+            <a:spLocks noGrp="1"/>
+          </p:cNvSpPr>
+          <p:nvPr>
+            <p:ph idx="1"/>
+          </p:nvPr>
+        </p:nvSpPr>
+        <p:spPr/>
+        <p:txBody>
+          <a:bodyPr/>
+          <a:lstStyle/>
+          <a:p>
+            <a:endParaRPr lang="en-US"/>
+          </a:p>
+        </p:txBody>
+      </p:sp>
+    </p:spTree>
+    <p:extLst>
+      <p:ext uri="{BB962C8B-B14F-4D97-AF65-F5344CB8AC3E}">
+        <p14:creationId xmlns:p14="http://schemas.microsoft.com/office/powerpoint/2010/main" val="1829704371"/>
+      </p:ext>
+    </p:extLst>
+  </p:cSld>
+  <p:clrMapOvr>
+    <a:masterClrMapping/>
+  </p:clrMapOvr>
 </p:sld>
 </file>
 

</xml_diff>